<commit_message>
Added source code reference in pptx file
</commit_message>
<xml_diff>
--- a/Documents/Serverless-Architecture.pptx
+++ b/Documents/Serverless-Architecture.pptx
@@ -397,7 +397,7 @@
           <a:p>
             <a:fld id="{CBD672D2-E051-4519-A84D-ED5C24243C1C}" type="datetimeFigureOut">
               <a:rPr lang="sv-SE" smtClean="0"/>
-              <a:t>2019-11-27</a:t>
+              <a:t>2019-11-28</a:t>
             </a:fld>
             <a:endParaRPr lang="sv-SE"/>
           </a:p>
@@ -33846,7 +33846,12 @@
             <p:ph type="body" sz="quarter" idx="10"/>
           </p:nvPr>
         </p:nvSpPr>
-        <p:spPr/>
+        <p:spPr>
+          <a:xfrm>
+            <a:off x="620108" y="4449525"/>
+            <a:ext cx="9310276" cy="1378068"/>
+          </a:xfrm>
+        </p:spPr>
         <p:txBody>
           <a:bodyPr vert="horz" lIns="91440" tIns="45720" rIns="91440" bIns="45720" rtlCol="0" anchor="t">
             <a:noAutofit/>
@@ -33863,7 +33868,7 @@
               </a:rPr>
               <a:t>khiem.ho@knowit.no</a:t>
             </a:r>
-            <a:endParaRPr lang="en-US"/>
+            <a:endParaRPr lang="en-US" dirty="0"/>
           </a:p>
           <a:p>
             <a:r>
@@ -33878,6 +33883,20 @@
               <a:rPr lang="en-US" dirty="0" err="1"/>
               <a:t>kkho</a:t>
             </a:r>
+            <a:endParaRPr lang="en-US" dirty="0"/>
+          </a:p>
+          <a:p>
+            <a:r>
+              <a:rPr lang="en-US" dirty="0"/>
+              <a:t>Source code: </a:t>
+            </a:r>
+            <a:r>
+              <a:rPr lang="en-US" dirty="0">
+                <a:hlinkClick r:id="rId3"/>
+              </a:rPr>
+              <a:t>https://github.com/kkho/serverless-architecture-poc</a:t>
+            </a:r>
+            <a:endParaRPr lang="en-US" dirty="0"/>
           </a:p>
           <a:p>
             <a:endParaRPr lang="en-US" dirty="0"/>
@@ -36197,33 +36216,6 @@
 </file>
 
 <file path=customXml/item1.xml><?xml version="1.0" encoding="utf-8"?>
-<p:properties xmlns:p="http://schemas.microsoft.com/office/2006/metadata/properties" xmlns:xsi="http://www.w3.org/2001/XMLSchema-instance" xmlns:pc="http://schemas.microsoft.com/office/infopath/2007/PartnerControls">
-  <documentManagement>
-    <LikesCount xmlns="http://schemas.microsoft.com/sharepoint/v3" xsi:nil="true"/>
-    <TaxCatchAll xmlns="46de1eba-0a9a-4987-9c91-2eddc8c65954"/>
-    <Ratings xmlns="http://schemas.microsoft.com/sharepoint/v3" xsi:nil="true"/>
-    <LikedBy xmlns="http://schemas.microsoft.com/sharepoint/v3">
-      <UserInfo>
-        <DisplayName/>
-        <AccountId xsi:nil="true"/>
-        <AccountType/>
-      </UserInfo>
-    </LikedBy>
-    <TaxKeywordTaxHTField xmlns="46de1eba-0a9a-4987-9c91-2eddc8c65954">
-      <Terms xmlns="http://schemas.microsoft.com/office/infopath/2007/PartnerControls"/>
-    </TaxKeywordTaxHTField>
-    <RatedBy xmlns="http://schemas.microsoft.com/sharepoint/v3">
-      <UserInfo>
-        <DisplayName/>
-        <AccountId xsi:nil="true"/>
-        <AccountType/>
-      </UserInfo>
-    </RatedBy>
-  </documentManagement>
-</p:properties>
-</file>
-
-<file path=customXml/item2.xml><?xml version="1.0" encoding="utf-8"?>
 <?mso-contentType ?>
 <FormTemplates xmlns="http://schemas.microsoft.com/sharepoint/v3/contenttype/forms">
   <Display>DocumentLibraryForm</Display>
@@ -36232,7 +36224,7 @@
 </FormTemplates>
 </file>
 
-<file path=customXml/item3.xml><?xml version="1.0" encoding="utf-8"?>
+<file path=customXml/item2.xml><?xml version="1.0" encoding="utf-8"?>
 <ct:contentTypeSchema xmlns:ct="http://schemas.microsoft.com/office/2006/metadata/contentType" xmlns:ma="http://schemas.microsoft.com/office/2006/metadata/properties/metaAttributes" ct:_="" ma:_="" ma:contentTypeName="Document" ma:contentTypeID="0x0101006CD0C4DFC92B1048ADDB8A01044CDCAE" ma:contentTypeVersion="13" ma:contentTypeDescription="Create a new document." ma:contentTypeScope="" ma:versionID="abf6fd55f55e4ed14022319e2d84e3a3">
   <xsd:schema xmlns:xsd="http://www.w3.org/2001/XMLSchema" xmlns:xs="http://www.w3.org/2001/XMLSchema" xmlns:p="http://schemas.microsoft.com/office/2006/metadata/properties" xmlns:ns1="http://schemas.microsoft.com/sharepoint/v3" xmlns:ns2="49232072-62f9-4e26-aba4-fabd0922de1b" xmlns:ns3="46de1eba-0a9a-4987-9c91-2eddc8c65954" xmlns:ns4="641b43f8-8292-4d8c-ad39-4013c3395558" targetNamespace="http://schemas.microsoft.com/office/2006/metadata/properties" ma:root="true" ma:fieldsID="3540ffd807c01c290411b8de9dd53bc3" ns1:_="" ns2:_="" ns3:_="" ns4:_="">
     <xsd:import namespace="http://schemas.microsoft.com/sharepoint/v3"/>
@@ -36491,26 +36483,34 @@
 </ct:contentTypeSchema>
 </file>
 
-<file path=customXml/itemProps1.xml><?xml version="1.0" encoding="utf-8"?>
-<ds:datastoreItem xmlns:ds="http://schemas.openxmlformats.org/officeDocument/2006/customXml" ds:itemID="{919E7D21-B60E-4E30-97E7-78014C473AB2}">
-  <ds:schemaRefs>
-    <ds:schemaRef ds:uri="http://schemas.microsoft.com/office/2006/metadata/properties"/>
-    <ds:schemaRef ds:uri="46de1eba-0a9a-4987-9c91-2eddc8c65954"/>
-    <ds:schemaRef ds:uri="http://schemas.microsoft.com/sharepoint/v3"/>
-    <ds:schemaRef ds:uri="49232072-62f9-4e26-aba4-fabd0922de1b"/>
-    <ds:schemaRef ds:uri="http://purl.org/dc/dcmitype/"/>
-    <ds:schemaRef ds:uri="http://purl.org/dc/terms/"/>
-    <ds:schemaRef ds:uri="http://schemas.microsoft.com/office/2006/documentManagement/types"/>
-    <ds:schemaRef ds:uri="http://schemas.openxmlformats.org/package/2006/metadata/core-properties"/>
-    <ds:schemaRef ds:uri="http://schemas.microsoft.com/office/infopath/2007/PartnerControls"/>
-    <ds:schemaRef ds:uri="641b43f8-8292-4d8c-ad39-4013c3395558"/>
-    <ds:schemaRef ds:uri="http://www.w3.org/XML/1998/namespace"/>
-    <ds:schemaRef ds:uri="http://purl.org/dc/elements/1.1/"/>
-  </ds:schemaRefs>
-</ds:datastoreItem>
+<file path=customXml/item3.xml><?xml version="1.0" encoding="utf-8"?>
+<p:properties xmlns:p="http://schemas.microsoft.com/office/2006/metadata/properties" xmlns:xsi="http://www.w3.org/2001/XMLSchema-instance" xmlns:pc="http://schemas.microsoft.com/office/infopath/2007/PartnerControls">
+  <documentManagement>
+    <LikesCount xmlns="http://schemas.microsoft.com/sharepoint/v3" xsi:nil="true"/>
+    <TaxCatchAll xmlns="46de1eba-0a9a-4987-9c91-2eddc8c65954"/>
+    <Ratings xmlns="http://schemas.microsoft.com/sharepoint/v3" xsi:nil="true"/>
+    <LikedBy xmlns="http://schemas.microsoft.com/sharepoint/v3">
+      <UserInfo>
+        <DisplayName/>
+        <AccountId xsi:nil="true"/>
+        <AccountType/>
+      </UserInfo>
+    </LikedBy>
+    <TaxKeywordTaxHTField xmlns="46de1eba-0a9a-4987-9c91-2eddc8c65954">
+      <Terms xmlns="http://schemas.microsoft.com/office/infopath/2007/PartnerControls"/>
+    </TaxKeywordTaxHTField>
+    <RatedBy xmlns="http://schemas.microsoft.com/sharepoint/v3">
+      <UserInfo>
+        <DisplayName/>
+        <AccountId xsi:nil="true"/>
+        <AccountType/>
+      </UserInfo>
+    </RatedBy>
+  </documentManagement>
+</p:properties>
 </file>
 
-<file path=customXml/itemProps2.xml><?xml version="1.0" encoding="utf-8"?>
+<file path=customXml/itemProps1.xml><?xml version="1.0" encoding="utf-8"?>
 <ds:datastoreItem xmlns:ds="http://schemas.openxmlformats.org/officeDocument/2006/customXml" ds:itemID="{03CF65E5-5CF0-4F84-9CE3-C6763CE7E091}">
   <ds:schemaRefs>
     <ds:schemaRef ds:uri="http://schemas.microsoft.com/sharepoint/v3/contenttype/forms"/>
@@ -36518,7 +36518,7 @@
 </ds:datastoreItem>
 </file>
 
-<file path=customXml/itemProps3.xml><?xml version="1.0" encoding="utf-8"?>
+<file path=customXml/itemProps2.xml><?xml version="1.0" encoding="utf-8"?>
 <ds:datastoreItem xmlns:ds="http://schemas.openxmlformats.org/officeDocument/2006/customXml" ds:itemID="{CF8FAB9E-4CE1-4C94-B3DD-27D1F801E370}">
   <ds:schemaRefs>
     <ds:schemaRef ds:uri="http://schemas.microsoft.com/office/2006/metadata/contentType"/>
@@ -36537,4 +36537,23 @@
     <ds:schemaRef ds:uri="http://schemas.microsoft.com/internal/obd"/>
   </ds:schemaRefs>
 </ds:datastoreItem>
+</file>
+
+<file path=customXml/itemProps3.xml><?xml version="1.0" encoding="utf-8"?>
+<ds:datastoreItem xmlns:ds="http://schemas.openxmlformats.org/officeDocument/2006/customXml" ds:itemID="{919E7D21-B60E-4E30-97E7-78014C473AB2}">
+  <ds:schemaRefs>
+    <ds:schemaRef ds:uri="http://schemas.microsoft.com/office/2006/metadata/properties"/>
+    <ds:schemaRef ds:uri="46de1eba-0a9a-4987-9c91-2eddc8c65954"/>
+    <ds:schemaRef ds:uri="http://schemas.microsoft.com/sharepoint/v3"/>
+    <ds:schemaRef ds:uri="49232072-62f9-4e26-aba4-fabd0922de1b"/>
+    <ds:schemaRef ds:uri="http://purl.org/dc/dcmitype/"/>
+    <ds:schemaRef ds:uri="http://purl.org/dc/terms/"/>
+    <ds:schemaRef ds:uri="http://schemas.microsoft.com/office/2006/documentManagement/types"/>
+    <ds:schemaRef ds:uri="http://schemas.openxmlformats.org/package/2006/metadata/core-properties"/>
+    <ds:schemaRef ds:uri="http://schemas.microsoft.com/office/infopath/2007/PartnerControls"/>
+    <ds:schemaRef ds:uri="641b43f8-8292-4d8c-ad39-4013c3395558"/>
+    <ds:schemaRef ds:uri="http://www.w3.org/XML/1998/namespace"/>
+    <ds:schemaRef ds:uri="http://purl.org/dc/elements/1.1/"/>
+  </ds:schemaRefs>
+</ds:datastoreItem>
 </file>
</xml_diff>